<commit_message>
OS seminar slides with discussion points
</commit_message>
<xml_diff>
--- a/digital-literacy/week-02/seminar/week-2-OS-seminar-discussion.pptx
+++ b/digital-literacy/week-02/seminar/week-2-OS-seminar-discussion.pptx
@@ -138,7 +138,7 @@
               <a:rPr b="0" lang="en-GB" sz="1400" spc="-1" strike="noStrike">
                 <a:latin typeface="Times New Roman"/>
               </a:rPr>
-              <a:t> </a:t>
+              <a:t>&lt;header&gt;</a:t>
             </a:r>
             <a:endParaRPr b="0" lang="en-GB" sz="1400" spc="-1" strike="noStrike">
               <a:latin typeface="Times New Roman"/>
@@ -173,7 +173,7 @@
               <a:rPr b="0" lang="en-GB" sz="1400" spc="-1" strike="noStrike">
                 <a:latin typeface="Times New Roman"/>
               </a:rPr>
-              <a:t> </a:t>
+              <a:t>&lt;date/time&gt;</a:t>
             </a:r>
             <a:endParaRPr b="0" lang="en-GB" sz="1400" spc="-1" strike="noStrike">
               <a:latin typeface="Times New Roman"/>
@@ -207,7 +207,7 @@
               <a:rPr b="0" lang="en-GB" sz="1400" spc="-1" strike="noStrike">
                 <a:latin typeface="Times New Roman"/>
               </a:rPr>
-              <a:t> </a:t>
+              <a:t>&lt;footer&gt;</a:t>
             </a:r>
             <a:endParaRPr b="0" lang="en-GB" sz="1400" spc="-1" strike="noStrike">
               <a:latin typeface="Times New Roman"/>
@@ -238,11 +238,11 @@
           <a:bodyPr lIns="0" rIns="0" tIns="0" bIns="0" anchor="b"/>
           <a:p>
             <a:pPr algn="r"/>
-            <a:fld id="{DD4CA06E-19B0-4414-A62B-9D3A33157AA8}" type="slidenum">
+            <a:fld id="{E4487191-F86E-4341-B6AD-9436C922CA2D}" type="slidenum">
               <a:rPr b="0" lang="en-GB" sz="1400" spc="-1" strike="noStrike">
                 <a:latin typeface="Times New Roman"/>
               </a:rPr>
-              <a:t>1</a:t>
+              <a:t>&lt;number&gt;</a:t>
             </a:fld>
             <a:endParaRPr b="0" lang="en-GB" sz="1400" spc="-1" strike="noStrike">
               <a:latin typeface="Times New Roman"/>
@@ -286,7 +286,7 @@
         <p:spPr>
           <a:xfrm>
             <a:off x="685800" y="1143000"/>
-            <a:ext cx="5485680" cy="3085560"/>
+            <a:ext cx="5485320" cy="3085200"/>
           </a:xfrm>
           <a:prstGeom prst="rect">
             <a:avLst/>
@@ -306,7 +306,7 @@
         <p:spPr>
           <a:xfrm>
             <a:off x="685800" y="4400640"/>
-            <a:ext cx="5485680" cy="3600000"/>
+            <a:ext cx="5485320" cy="3599640"/>
           </a:xfrm>
           <a:prstGeom prst="rect">
             <a:avLst/>
@@ -330,7 +330,7 @@
         <p:spPr>
           <a:xfrm>
             <a:off x="3884760" y="8685360"/>
-            <a:ext cx="2971080" cy="457920"/>
+            <a:ext cx="2970720" cy="457560"/>
           </a:xfrm>
           <a:prstGeom prst="rect">
             <a:avLst/>
@@ -346,25 +346,6 @@
           <a:effectRef idx="0"/>
           <a:fontRef idx="minor"/>
         </p:style>
-        <p:txBody>
-          <a:bodyPr lIns="90000" rIns="90000" tIns="45000" bIns="45000" anchor="b"/>
-          <a:p>
-            <a:pPr algn="r">
-              <a:lnSpc>
-                <a:spcPct val="100000"/>
-              </a:lnSpc>
-            </a:pPr>
-            <a:fld id="{B45C1D6C-0E4C-4696-B991-A2738DF58AE2}" type="slidenum">
-              <a:rPr b="0" lang="en-GB" sz="1400" spc="-1" strike="noStrike">
-                <a:latin typeface="Times New Roman"/>
-              </a:rPr>
-              <a:t>1</a:t>
-            </a:fld>
-            <a:endParaRPr b="0" lang="en-GB" sz="1400" spc="-1" strike="noStrike">
-              <a:latin typeface="Arial"/>
-            </a:endParaRPr>
-          </a:p>
-        </p:txBody>
       </p:sp>
     </p:spTree>
   </p:cSld>
@@ -401,7 +382,7 @@
         <p:spPr>
           <a:xfrm>
             <a:off x="685800" y="4343400"/>
-            <a:ext cx="5485680" cy="4114080"/>
+            <a:ext cx="5485320" cy="4113720"/>
           </a:xfrm>
           <a:prstGeom prst="rect">
             <a:avLst/>
@@ -410,7 +391,7 @@
         <p:txBody>
           <a:bodyPr lIns="81360" rIns="81360" tIns="81360" bIns="81360"/>
           <a:p>
-            <a:pPr marL="216000" indent="-216000">
+            <a:pPr marL="216000" indent="-215640">
               <a:lnSpc>
                 <a:spcPct val="100000"/>
               </a:lnSpc>
@@ -444,7 +425,7 @@
         <p:spPr>
           <a:xfrm>
             <a:off x="380880" y="685800"/>
-            <a:ext cx="6095160" cy="3428280"/>
+            <a:ext cx="6094800" cy="3427920"/>
           </a:xfrm>
           <a:prstGeom prst="rect">
             <a:avLst/>
@@ -486,7 +467,7 @@
         <p:spPr>
           <a:xfrm>
             <a:off x="380880" y="685800"/>
-            <a:ext cx="6095160" cy="3428280"/>
+            <a:ext cx="6094800" cy="3427920"/>
           </a:xfrm>
           <a:prstGeom prst="rect">
             <a:avLst/>
@@ -506,7 +487,7 @@
         <p:spPr>
           <a:xfrm>
             <a:off x="685800" y="4343400"/>
-            <a:ext cx="5485680" cy="4114080"/>
+            <a:ext cx="5485320" cy="4113720"/>
           </a:xfrm>
           <a:prstGeom prst="rect">
             <a:avLst/>
@@ -515,7 +496,7 @@
         <p:txBody>
           <a:bodyPr lIns="0" rIns="0" tIns="0" bIns="0"/>
           <a:p>
-            <a:pPr marL="216000" indent="-216000">
+            <a:pPr marL="216000" indent="-215640">
               <a:lnSpc>
                 <a:spcPct val="100000"/>
               </a:lnSpc>
@@ -525,7 +506,7 @@
             </a:endParaRPr>
           </a:p>
           <a:p>
-            <a:pPr marL="216000" indent="-216000">
+            <a:pPr marL="216000" indent="-215640">
               <a:lnSpc>
                 <a:spcPct val="100000"/>
               </a:lnSpc>
@@ -571,7 +552,7 @@
         <p:spPr>
           <a:xfrm>
             <a:off x="380880" y="685800"/>
-            <a:ext cx="6095160" cy="3428280"/>
+            <a:ext cx="6094800" cy="3427920"/>
           </a:xfrm>
           <a:prstGeom prst="rect">
             <a:avLst/>
@@ -591,7 +572,7 @@
         <p:spPr>
           <a:xfrm>
             <a:off x="685800" y="4343400"/>
-            <a:ext cx="5485680" cy="4114080"/>
+            <a:ext cx="5485320" cy="4113720"/>
           </a:xfrm>
           <a:prstGeom prst="rect">
             <a:avLst/>
@@ -600,7 +581,7 @@
         <p:txBody>
           <a:bodyPr lIns="0" rIns="0" tIns="0" bIns="0"/>
           <a:p>
-            <a:pPr marL="216000" indent="-216000">
+            <a:pPr marL="216000" indent="-215640">
               <a:lnSpc>
                 <a:spcPct val="100000"/>
               </a:lnSpc>
@@ -620,7 +601,7 @@
             </a:endParaRPr>
           </a:p>
           <a:p>
-            <a:pPr marL="216000" indent="-216000">
+            <a:pPr marL="216000" indent="-215640">
               <a:lnSpc>
                 <a:spcPct val="100000"/>
               </a:lnSpc>
@@ -630,7 +611,7 @@
             </a:endParaRPr>
           </a:p>
           <a:p>
-            <a:pPr marL="216000" indent="-216000">
+            <a:pPr marL="216000" indent="-215640">
               <a:lnSpc>
                 <a:spcPct val="100000"/>
               </a:lnSpc>
@@ -676,7 +657,7 @@
         <p:spPr>
           <a:xfrm>
             <a:off x="685800" y="1143000"/>
-            <a:ext cx="5485680" cy="3085560"/>
+            <a:ext cx="5485320" cy="3085200"/>
           </a:xfrm>
           <a:prstGeom prst="rect">
             <a:avLst/>
@@ -696,7 +677,7 @@
         <p:spPr>
           <a:xfrm>
             <a:off x="685800" y="4400640"/>
-            <a:ext cx="5485680" cy="3600000"/>
+            <a:ext cx="5485320" cy="3599640"/>
           </a:xfrm>
           <a:prstGeom prst="rect">
             <a:avLst/>
@@ -720,7 +701,7 @@
         <p:spPr>
           <a:xfrm>
             <a:off x="3884760" y="8685360"/>
-            <a:ext cx="2971080" cy="457920"/>
+            <a:ext cx="2970720" cy="457560"/>
           </a:xfrm>
           <a:prstGeom prst="rect">
             <a:avLst/>
@@ -736,25 +717,6 @@
           <a:effectRef idx="0"/>
           <a:fontRef idx="minor"/>
         </p:style>
-        <p:txBody>
-          <a:bodyPr lIns="90000" rIns="90000" tIns="45000" bIns="45000" anchor="b"/>
-          <a:p>
-            <a:pPr algn="r">
-              <a:lnSpc>
-                <a:spcPct val="100000"/>
-              </a:lnSpc>
-            </a:pPr>
-            <a:fld id="{41ED85E3-88AB-4379-B5E7-A7F5E2C823D0}" type="slidenum">
-              <a:rPr b="0" lang="en-GB" sz="1400" spc="-1" strike="noStrike">
-                <a:latin typeface="Times New Roman"/>
-              </a:rPr>
-              <a:t>&lt;number&gt;</a:t>
-            </a:fld>
-            <a:endParaRPr b="0" lang="en-GB" sz="1400" spc="-1" strike="noStrike">
-              <a:latin typeface="Arial"/>
-            </a:endParaRPr>
-          </a:p>
-        </p:txBody>
       </p:sp>
     </p:spTree>
   </p:cSld>
@@ -7454,7 +7416,7 @@
         <p:spPr>
           <a:xfrm>
             <a:off x="0" y="5094000"/>
-            <a:ext cx="12191400" cy="1763280"/>
+            <a:ext cx="12191040" cy="1762920"/>
           </a:xfrm>
           <a:prstGeom prst="rect">
             <a:avLst/>
@@ -7489,7 +7451,7 @@
         <p:spPr>
           <a:xfrm>
             <a:off x="-300600" y="4680360"/>
-            <a:ext cx="4254480" cy="2590200"/>
+            <a:ext cx="4254120" cy="2589840"/>
           </a:xfrm>
           <a:prstGeom prst="rect">
             <a:avLst/>
@@ -8540,7 +8502,7 @@
         <p:spPr>
           <a:xfrm>
             <a:off x="6095880" y="1325520"/>
-            <a:ext cx="360" cy="5531760"/>
+            <a:ext cx="360" cy="5531400"/>
           </a:xfrm>
           <a:custGeom>
             <a:avLst/>
@@ -8833,7 +8795,7 @@
         <p:spPr>
           <a:xfrm>
             <a:off x="479160" y="1122480"/>
-            <a:ext cx="9143280" cy="2387160"/>
+            <a:ext cx="9142920" cy="2386800"/>
           </a:xfrm>
           <a:prstGeom prst="rect">
             <a:avLst/>
@@ -8946,7 +8908,7 @@
         <p:spPr>
           <a:xfrm>
             <a:off x="0" y="0"/>
-            <a:ext cx="12191400" cy="1325160"/>
+            <a:ext cx="12191040" cy="1324800"/>
           </a:xfrm>
           <a:prstGeom prst="rect">
             <a:avLst/>
@@ -9000,7 +8962,7 @@
         <p:spPr>
           <a:xfrm>
             <a:off x="496080" y="1514880"/>
-            <a:ext cx="11199240" cy="3000600"/>
+            <a:ext cx="11198880" cy="3000240"/>
           </a:xfrm>
           <a:prstGeom prst="rect">
             <a:avLst/>
@@ -9019,7 +8981,7 @@
         <p:txBody>
           <a:bodyPr lIns="90000" rIns="90000" tIns="45000" bIns="45000"/>
           <a:p>
-            <a:pPr marL="685800" indent="-570960">
+            <a:pPr marL="685800" indent="-570600">
               <a:lnSpc>
                 <a:spcPct val="90000"/>
               </a:lnSpc>
@@ -9047,7 +9009,7 @@
             </a:endParaRPr>
           </a:p>
           <a:p>
-            <a:pPr marL="685800" indent="-570960">
+            <a:pPr marL="685800" indent="-570600">
               <a:lnSpc>
                 <a:spcPct val="90000"/>
               </a:lnSpc>
@@ -9075,7 +9037,7 @@
             </a:endParaRPr>
           </a:p>
           <a:p>
-            <a:pPr marL="685800" indent="-570960">
+            <a:pPr marL="685800" indent="-570600">
               <a:lnSpc>
                 <a:spcPct val="90000"/>
               </a:lnSpc>
@@ -9103,7 +9065,7 @@
             </a:endParaRPr>
           </a:p>
           <a:p>
-            <a:pPr marL="685800" indent="-570960">
+            <a:pPr marL="685800" indent="-570600">
               <a:lnSpc>
                 <a:spcPct val="90000"/>
               </a:lnSpc>
@@ -9190,7 +9152,7 @@
         <p:spPr>
           <a:xfrm>
             <a:off x="7687440" y="0"/>
-            <a:ext cx="4503960" cy="6857280"/>
+            <a:ext cx="4503600" cy="6856920"/>
           </a:xfrm>
           <a:prstGeom prst="rect">
             <a:avLst/>
@@ -9300,7 +9262,7 @@
         <p:spPr>
           <a:xfrm>
             <a:off x="1629360" y="1300320"/>
-            <a:ext cx="3813480" cy="4119840"/>
+            <a:ext cx="3813120" cy="4119480"/>
           </a:xfrm>
           <a:prstGeom prst="rect">
             <a:avLst/>
@@ -9372,7 +9334,7 @@
         <p:spPr>
           <a:xfrm>
             <a:off x="1529640" y="636480"/>
-            <a:ext cx="6040800" cy="5201640"/>
+            <a:ext cx="6040440" cy="5201280"/>
           </a:xfrm>
           <a:prstGeom prst="rect">
             <a:avLst/>
@@ -9391,7 +9353,7 @@
         <p:spPr>
           <a:xfrm>
             <a:off x="9204120" y="0"/>
-            <a:ext cx="2987280" cy="6857280"/>
+            <a:ext cx="2986920" cy="6856920"/>
           </a:xfrm>
           <a:prstGeom prst="rect">
             <a:avLst/>
@@ -9533,7 +9495,7 @@
         <p:spPr>
           <a:xfrm>
             <a:off x="9227160" y="0"/>
-            <a:ext cx="2987280" cy="6857280"/>
+            <a:ext cx="2986920" cy="6856920"/>
           </a:xfrm>
           <a:prstGeom prst="rect">
             <a:avLst/>
@@ -9643,7 +9605,7 @@
         <p:spPr>
           <a:xfrm>
             <a:off x="938880" y="1516320"/>
-            <a:ext cx="4028400" cy="3055680"/>
+            <a:ext cx="4028040" cy="3055320"/>
           </a:xfrm>
           <a:prstGeom prst="rect">
             <a:avLst/>
@@ -9662,7 +9624,7 @@
         <p:spPr>
           <a:xfrm>
             <a:off x="771480" y="4570560"/>
-            <a:ext cx="4624920" cy="538920"/>
+            <a:ext cx="4624560" cy="538560"/>
           </a:xfrm>
           <a:prstGeom prst="rect">
             <a:avLst/>
@@ -9745,7 +9707,7 @@
         <p:spPr>
           <a:xfrm>
             <a:off x="6061680" y="958320"/>
-            <a:ext cx="1153080" cy="1361160"/>
+            <a:ext cx="1152720" cy="1360800"/>
           </a:xfrm>
           <a:prstGeom prst="rect">
             <a:avLst/>
@@ -9768,7 +9730,7 @@
         <p:spPr>
           <a:xfrm>
             <a:off x="6818040" y="3798720"/>
-            <a:ext cx="1611000" cy="1291680"/>
+            <a:ext cx="1610640" cy="1291320"/>
           </a:xfrm>
           <a:prstGeom prst="rect">
             <a:avLst/>
@@ -9840,7 +9802,7 @@
         <p:spPr>
           <a:xfrm>
             <a:off x="3583440" y="2787840"/>
-            <a:ext cx="2472840" cy="820800"/>
+            <a:ext cx="2472480" cy="820440"/>
           </a:xfrm>
           <a:prstGeom prst="rect">
             <a:avLst/>
@@ -9863,7 +9825,7 @@
         <p:spPr>
           <a:xfrm>
             <a:off x="751320" y="703800"/>
-            <a:ext cx="2831400" cy="1256760"/>
+            <a:ext cx="2831040" cy="1256400"/>
           </a:xfrm>
           <a:prstGeom prst="rect">
             <a:avLst/>
@@ -9886,7 +9848,7 @@
         <p:spPr>
           <a:xfrm>
             <a:off x="1670040" y="4170240"/>
-            <a:ext cx="3485160" cy="1829520"/>
+            <a:ext cx="3484800" cy="1829160"/>
           </a:xfrm>
           <a:prstGeom prst="rect">
             <a:avLst/>
@@ -9905,7 +9867,7 @@
         <p:spPr>
           <a:xfrm>
             <a:off x="9204120" y="0"/>
-            <a:ext cx="2987280" cy="6857280"/>
+            <a:ext cx="2986920" cy="6856920"/>
           </a:xfrm>
           <a:prstGeom prst="rect">
             <a:avLst/>
@@ -10011,7 +9973,7 @@
         <p:spPr>
           <a:xfrm>
             <a:off x="0" y="0"/>
-            <a:ext cx="12191400" cy="1325160"/>
+            <a:ext cx="12191040" cy="1324800"/>
           </a:xfrm>
           <a:prstGeom prst="rect">
             <a:avLst/>
@@ -10065,7 +10027,7 @@
         <p:spPr>
           <a:xfrm>
             <a:off x="6630480" y="2004120"/>
-            <a:ext cx="4613760" cy="3509280"/>
+            <a:ext cx="4613400" cy="3508920"/>
           </a:xfrm>
           <a:prstGeom prst="rect">
             <a:avLst/>
@@ -10118,7 +10080,7 @@
         <p:spPr>
           <a:xfrm>
             <a:off x="271080" y="1937880"/>
-            <a:ext cx="5526360" cy="3876120"/>
+            <a:ext cx="5526000" cy="3875760"/>
           </a:xfrm>
           <a:prstGeom prst="rect">
             <a:avLst/>
@@ -10186,7 +10148,7 @@
         <p:spPr>
           <a:xfrm>
             <a:off x="0" y="0"/>
-            <a:ext cx="12191400" cy="1325160"/>
+            <a:ext cx="12191040" cy="1324800"/>
           </a:xfrm>
           <a:prstGeom prst="rect">
             <a:avLst/>
@@ -10240,7 +10202,7 @@
         <p:spPr>
           <a:xfrm>
             <a:off x="496080" y="1514880"/>
-            <a:ext cx="11199240" cy="1384560"/>
+            <a:ext cx="11198880" cy="1384200"/>
           </a:xfrm>
           <a:prstGeom prst="rect">
             <a:avLst/>
@@ -10259,7 +10221,7 @@
         <p:txBody>
           <a:bodyPr lIns="90000" rIns="90000" tIns="45000" bIns="45000"/>
           <a:p>
-            <a:pPr marL="457200" indent="-342360">
+            <a:pPr marL="457200" indent="-342000">
               <a:lnSpc>
                 <a:spcPct val="90000"/>
               </a:lnSpc>
@@ -10287,7 +10249,7 @@
             </a:endParaRPr>
           </a:p>
           <a:p>
-            <a:pPr marL="457200" indent="-342360">
+            <a:pPr marL="457200" indent="-342000">
               <a:lnSpc>
                 <a:spcPct val="90000"/>
               </a:lnSpc>

</xml_diff>